<commit_message>
ppt: remove photo at last slide
</commit_message>
<xml_diff>
--- a/PuneVimUSer.pptx
+++ b/PuneVimUSer.pptx
@@ -184,7 +184,7 @@
           <a:p>
             <a:fld id="{31837531-846D-41CC-909C-D8ABFD67869C}" type="datetimeFigureOut">
               <a:rPr lang="en-US" smtClean="0"/>
-              <a:t>2/17/2016</a:t>
+              <a:t>2/22/2016</a:t>
             </a:fld>
             <a:endParaRPr lang="en-US"/>
           </a:p>
@@ -500,7 +500,7 @@
           <a:p>
             <a:fld id="{31837531-846D-41CC-909C-D8ABFD67869C}" type="datetimeFigureOut">
               <a:rPr lang="en-US" smtClean="0"/>
-              <a:t>2/17/2016</a:t>
+              <a:t>2/22/2016</a:t>
             </a:fld>
             <a:endParaRPr lang="en-US"/>
           </a:p>
@@ -675,7 +675,7 @@
           <a:p>
             <a:fld id="{31837531-846D-41CC-909C-D8ABFD67869C}" type="datetimeFigureOut">
               <a:rPr lang="en-US" smtClean="0"/>
-              <a:t>2/17/2016</a:t>
+              <a:t>2/22/2016</a:t>
             </a:fld>
             <a:endParaRPr lang="en-US"/>
           </a:p>
@@ -793,7 +793,7 @@
           <a:p>
             <a:fld id="{31837531-846D-41CC-909C-D8ABFD67869C}" type="datetimeFigureOut">
               <a:rPr lang="en-US" smtClean="0"/>
-              <a:t>2/17/2016</a:t>
+              <a:t>2/22/2016</a:t>
             </a:fld>
             <a:endParaRPr lang="en-US"/>
           </a:p>
@@ -1091,7 +1091,7 @@
           <a:p>
             <a:fld id="{31837531-846D-41CC-909C-D8ABFD67869C}" type="datetimeFigureOut">
               <a:rPr lang="en-US" smtClean="0"/>
-              <a:t>2/17/2016</a:t>
+              <a:t>2/22/2016</a:t>
             </a:fld>
             <a:endParaRPr lang="en-US"/>
           </a:p>
@@ -1384,7 +1384,7 @@
           <a:p>
             <a:fld id="{31837531-846D-41CC-909C-D8ABFD67869C}" type="datetimeFigureOut">
               <a:rPr lang="en-US" smtClean="0"/>
-              <a:t>2/17/2016</a:t>
+              <a:t>2/22/2016</a:t>
             </a:fld>
             <a:endParaRPr lang="en-US"/>
           </a:p>
@@ -1812,7 +1812,7 @@
           <a:p>
             <a:fld id="{31837531-846D-41CC-909C-D8ABFD67869C}" type="datetimeFigureOut">
               <a:rPr lang="en-US" smtClean="0"/>
-              <a:t>2/17/2016</a:t>
+              <a:t>2/22/2016</a:t>
             </a:fld>
             <a:endParaRPr lang="en-US"/>
           </a:p>
@@ -1930,7 +1930,7 @@
           <a:p>
             <a:fld id="{31837531-846D-41CC-909C-D8ABFD67869C}" type="datetimeFigureOut">
               <a:rPr lang="en-US" smtClean="0"/>
-              <a:t>2/17/2016</a:t>
+              <a:t>2/22/2016</a:t>
             </a:fld>
             <a:endParaRPr lang="en-US"/>
           </a:p>
@@ -2020,7 +2020,7 @@
           <a:p>
             <a:fld id="{31837531-846D-41CC-909C-D8ABFD67869C}" type="datetimeFigureOut">
               <a:rPr lang="en-US" smtClean="0"/>
-              <a:t>2/17/2016</a:t>
+              <a:t>2/22/2016</a:t>
             </a:fld>
             <a:endParaRPr lang="en-US"/>
           </a:p>
@@ -2270,7 +2270,7 @@
           <a:p>
             <a:fld id="{31837531-846D-41CC-909C-D8ABFD67869C}" type="datetimeFigureOut">
               <a:rPr lang="en-US" smtClean="0"/>
-              <a:t>2/17/2016</a:t>
+              <a:t>2/22/2016</a:t>
             </a:fld>
             <a:endParaRPr lang="en-US"/>
           </a:p>
@@ -2786,7 +2786,7 @@
           <a:p>
             <a:fld id="{31837531-846D-41CC-909C-D8ABFD67869C}" type="datetimeFigureOut">
               <a:rPr lang="en-US" smtClean="0"/>
-              <a:t>2/17/2016</a:t>
+              <a:t>2/22/2016</a:t>
             </a:fld>
             <a:endParaRPr lang="en-US"/>
           </a:p>
@@ -3016,7 +3016,7 @@
           <a:p>
             <a:fld id="{31837531-846D-41CC-909C-D8ABFD67869C}" type="datetimeFigureOut">
               <a:rPr lang="en-US" smtClean="0"/>
-              <a:t>2/17/2016</a:t>
+              <a:t>2/22/2016</a:t>
             </a:fld>
             <a:endParaRPr lang="en-US"/>
           </a:p>
@@ -3637,11 +3637,11 @@
   <p:clrMapOvr>
     <a:masterClrMapping/>
   </p:clrMapOvr>
-  <mc:AlternateContent xmlns:mc="http://schemas.openxmlformats.org/markup-compatibility/2006">
-    <mc:Choice xmlns:p14="http://schemas.microsoft.com/office/powerpoint/2010/main" Requires="p14">
+  <mc:AlternateContent xmlns:mc="http://schemas.openxmlformats.org/markup-compatibility/2006" xmlns:p14="http://schemas.microsoft.com/office/powerpoint/2010/main">
+    <mc:Choice Requires="p14">
       <p:transition spd="slow" p14:dur="2000"/>
     </mc:Choice>
-    <mc:Fallback>
+    <mc:Fallback xmlns="">
       <p:transition spd="slow"/>
     </mc:Fallback>
   </mc:AlternateContent>
@@ -3789,11 +3789,11 @@
   <p:clrMapOvr>
     <a:masterClrMapping/>
   </p:clrMapOvr>
-  <mc:AlternateContent xmlns:mc="http://schemas.openxmlformats.org/markup-compatibility/2006">
-    <mc:Choice xmlns:p14="http://schemas.microsoft.com/office/powerpoint/2010/main" Requires="p14">
+  <mc:AlternateContent xmlns:mc="http://schemas.openxmlformats.org/markup-compatibility/2006" xmlns:p14="http://schemas.microsoft.com/office/powerpoint/2010/main">
+    <mc:Choice Requires="p14">
       <p:transition spd="slow" p14:dur="2000"/>
     </mc:Choice>
-    <mc:Fallback>
+    <mc:Fallback xmlns="">
       <p:transition spd="slow"/>
     </mc:Fallback>
   </mc:AlternateContent>
@@ -4020,11 +4020,11 @@
   <p:clrMapOvr>
     <a:masterClrMapping/>
   </p:clrMapOvr>
-  <mc:AlternateContent xmlns:mc="http://schemas.openxmlformats.org/markup-compatibility/2006">
-    <mc:Choice xmlns:p14="http://schemas.microsoft.com/office/powerpoint/2010/main" Requires="p14">
+  <mc:AlternateContent xmlns:mc="http://schemas.openxmlformats.org/markup-compatibility/2006" xmlns:p14="http://schemas.microsoft.com/office/powerpoint/2010/main">
+    <mc:Choice Requires="p14">
       <p:transition spd="slow" p14:dur="2000"/>
     </mc:Choice>
-    <mc:Fallback>
+    <mc:Fallback xmlns="">
       <p:transition spd="slow"/>
     </mc:Fallback>
   </mc:AlternateContent>
@@ -4072,11 +4072,7 @@
           <a:p>
             <a:r>
               <a:rPr lang="en-US" u="sng" cap="none" dirty="0" smtClean="0"/>
-              <a:t>Edit </a:t>
-            </a:r>
-            <a:r>
-              <a:rPr lang="en-US" u="sng" cap="none" dirty="0" smtClean="0"/>
-              <a:t>Continued – text object and registers</a:t>
+              <a:t>Edit Continued – text object and registers</a:t>
             </a:r>
             <a:endParaRPr lang="en-US" u="sng" cap="none" dirty="0"/>
           </a:p>
@@ -4198,11 +4194,11 @@
   <p:clrMapOvr>
     <a:masterClrMapping/>
   </p:clrMapOvr>
-  <mc:AlternateContent xmlns:mc="http://schemas.openxmlformats.org/markup-compatibility/2006">
-    <mc:Choice xmlns:p14="http://schemas.microsoft.com/office/powerpoint/2010/main" Requires="p14">
+  <mc:AlternateContent xmlns:mc="http://schemas.openxmlformats.org/markup-compatibility/2006" xmlns:p14="http://schemas.microsoft.com/office/powerpoint/2010/main">
+    <mc:Choice Requires="p14">
       <p:transition spd="slow" p14:dur="2000"/>
     </mc:Choice>
-    <mc:Fallback>
+    <mc:Fallback xmlns="">
       <p:transition spd="slow"/>
     </mc:Fallback>
   </mc:AlternateContent>
@@ -4291,11 +4287,7 @@
             </a:r>
             <a:r>
               <a:rPr lang="en-US" dirty="0" smtClean="0"/>
-              <a:t>using </a:t>
-            </a:r>
-            <a:r>
-              <a:rPr lang="en-US" dirty="0" smtClean="0"/>
-              <a:t>any positioning or navigational keys</a:t>
+              <a:t>using any positioning or navigational keys</a:t>
             </a:r>
             <a:endParaRPr lang="en-US" dirty="0"/>
           </a:p>
@@ -4317,11 +4309,7 @@
             </a:r>
             <a:r>
               <a:rPr lang="en-US" dirty="0" smtClean="0"/>
-              <a:t> </a:t>
-            </a:r>
-            <a:r>
-              <a:rPr lang="en-US" dirty="0" smtClean="0"/>
-              <a:t>– </a:t>
+              <a:t> – </a:t>
             </a:r>
             <a:r>
               <a:rPr lang="en-US" dirty="0"/>
@@ -4418,11 +4406,11 @@
   <p:clrMapOvr>
     <a:masterClrMapping/>
   </p:clrMapOvr>
-  <mc:AlternateContent xmlns:mc="http://schemas.openxmlformats.org/markup-compatibility/2006">
-    <mc:Choice xmlns:p14="http://schemas.microsoft.com/office/powerpoint/2010/main" Requires="p14">
+  <mc:AlternateContent xmlns:mc="http://schemas.openxmlformats.org/markup-compatibility/2006" xmlns:p14="http://schemas.microsoft.com/office/powerpoint/2010/main">
+    <mc:Choice Requires="p14">
       <p:transition spd="slow" p14:dur="2000"/>
     </mc:Choice>
-    <mc:Fallback>
+    <mc:Fallback xmlns="">
       <p:transition spd="slow"/>
     </mc:Fallback>
   </mc:AlternateContent>
@@ -4470,15 +4458,7 @@
           <a:p>
             <a:r>
               <a:rPr lang="en-US" u="sng" cap="none" dirty="0" smtClean="0"/>
-              <a:t>Edit </a:t>
-            </a:r>
-            <a:r>
-              <a:rPr lang="en-US" u="sng" cap="none" dirty="0" smtClean="0"/>
-              <a:t>with operators – Insert Mode</a:t>
-            </a:r>
-            <a:r>
-              <a:rPr lang="en-US" u="sng" cap="none" dirty="0" smtClean="0"/>
-              <a:t/>
+              <a:t>Edit with operators – Insert Mode</a:t>
             </a:r>
             <a:br>
               <a:rPr lang="en-US" u="sng" cap="none" dirty="0" smtClean="0"/>
@@ -4638,11 +4618,6 @@
               </a:rPr>
               <a:t>:help ins-completion</a:t>
             </a:r>
-            <a:endParaRPr lang="en-US" dirty="0">
-              <a:solidFill>
-                <a:srgbClr val="92D050"/>
-              </a:solidFill>
-            </a:endParaRPr>
           </a:p>
           <a:p>
             <a:pPr marL="0" indent="0">
@@ -4843,11 +4818,11 @@
   <p:clrMapOvr>
     <a:masterClrMapping/>
   </p:clrMapOvr>
-  <mc:AlternateContent xmlns:mc="http://schemas.openxmlformats.org/markup-compatibility/2006">
-    <mc:Choice xmlns:p14="http://schemas.microsoft.com/office/powerpoint/2010/main" Requires="p14">
+  <mc:AlternateContent xmlns:mc="http://schemas.openxmlformats.org/markup-compatibility/2006" xmlns:p14="http://schemas.microsoft.com/office/powerpoint/2010/main">
+    <mc:Choice Requires="p14">
       <p:transition spd="slow" p14:dur="2000"/>
     </mc:Choice>
-    <mc:Fallback>
+    <mc:Fallback xmlns="">
       <p:transition spd="slow"/>
     </mc:Fallback>
   </mc:AlternateContent>
@@ -4948,11 +4923,7 @@
             </a:r>
             <a:r>
               <a:rPr lang="en-US" dirty="0" smtClean="0"/>
-              <a:t>on’t trust </a:t>
-            </a:r>
-            <a:r>
-              <a:rPr lang="en-US" dirty="0" smtClean="0"/>
-              <a:t>machines</a:t>
+              <a:t>on’t trust machines</a:t>
             </a:r>
             <a:r>
               <a:rPr lang="en-US" dirty="0"/>
@@ -5011,11 +4982,11 @@
   <p:clrMapOvr>
     <a:masterClrMapping/>
   </p:clrMapOvr>
-  <mc:AlternateContent xmlns:mc="http://schemas.openxmlformats.org/markup-compatibility/2006">
-    <mc:Choice xmlns:p14="http://schemas.microsoft.com/office/powerpoint/2010/main" Requires="p14">
+  <mc:AlternateContent xmlns:mc="http://schemas.openxmlformats.org/markup-compatibility/2006" xmlns:p14="http://schemas.microsoft.com/office/powerpoint/2010/main">
+    <mc:Choice Requires="p14">
       <p:transition spd="slow" p14:dur="2000"/>
     </mc:Choice>
-    <mc:Fallback>
+    <mc:Fallback xmlns="">
       <p:transition spd="slow"/>
     </mc:Fallback>
   </mc:AlternateContent>
@@ -5227,11 +5198,11 @@
   <p:clrMapOvr>
     <a:masterClrMapping/>
   </p:clrMapOvr>
-  <mc:AlternateContent xmlns:mc="http://schemas.openxmlformats.org/markup-compatibility/2006">
-    <mc:Choice xmlns:p14="http://schemas.microsoft.com/office/powerpoint/2010/main" Requires="p14">
+  <mc:AlternateContent xmlns:mc="http://schemas.openxmlformats.org/markup-compatibility/2006" xmlns:p14="http://schemas.microsoft.com/office/powerpoint/2010/main">
+    <mc:Choice Requires="p14">
       <p:transition spd="slow" p14:dur="2000"/>
     </mc:Choice>
-    <mc:Fallback>
+    <mc:Fallback xmlns="">
       <p:transition spd="slow"/>
     </mc:Fallback>
   </mc:AlternateContent>
@@ -5495,6 +5466,10 @@
           <a:bodyPr/>
           <a:lstStyle/>
           <a:p>
+            <a:r>
+              <a:rPr lang="en-US" smtClean="0"/>
+              <a:t>Any Questions</a:t>
+            </a:r>
             <a:endParaRPr lang="en-US" dirty="0" smtClean="0"/>
           </a:p>
           <a:p>
@@ -5525,60 +5500,6 @@
           </a:p>
         </p:txBody>
       </p:sp>
-      <p:pic>
-        <p:nvPicPr>
-          <p:cNvPr id="5125" name="Picture 5"/>
-          <p:cNvPicPr>
-            <a:picLocks noChangeAspect="1" noChangeArrowheads="1"/>
-          </p:cNvPicPr>
-          <p:nvPr/>
-        </p:nvPicPr>
-        <p:blipFill>
-          <a:blip r:embed="rId2">
-            <a:extLst>
-              <a:ext uri="{28A0092B-C50C-407E-A947-70E740481C1C}">
-                <a14:useLocalDpi xmlns:a14="http://schemas.microsoft.com/office/drawing/2010/main" val="0"/>
-              </a:ext>
-            </a:extLst>
-          </a:blip>
-          <a:srcRect/>
-          <a:stretch>
-            <a:fillRect/>
-          </a:stretch>
-        </p:blipFill>
-        <p:spPr bwMode="auto">
-          <a:xfrm>
-            <a:off x="3581400" y="3810000"/>
-            <a:ext cx="2162175" cy="2114550"/>
-          </a:xfrm>
-          <a:prstGeom prst="rect">
-            <a:avLst/>
-          </a:prstGeom>
-          <a:noFill/>
-          <a:ln>
-            <a:noFill/>
-          </a:ln>
-          <a:extLst>
-            <a:ext uri="{909E8E84-426E-40DD-AFC4-6F175D3DCCD1}">
-              <a14:hiddenFill xmlns:a14="http://schemas.microsoft.com/office/drawing/2010/main">
-                <a:solidFill>
-                  <a:schemeClr val="accent1"/>
-                </a:solidFill>
-              </a14:hiddenFill>
-            </a:ext>
-            <a:ext uri="{91240B29-F687-4F45-9708-019B960494DF}">
-              <a14:hiddenLine xmlns:a14="http://schemas.microsoft.com/office/drawing/2010/main" w="9525">
-                <a:solidFill>
-                  <a:schemeClr val="tx1"/>
-                </a:solidFill>
-                <a:miter lim="800000"/>
-                <a:headEnd/>
-                <a:tailEnd/>
-              </a14:hiddenLine>
-            </a:ext>
-          </a:extLst>
-        </p:spPr>
-      </p:pic>
     </p:spTree>
     <p:extLst>
       <p:ext uri="{BB962C8B-B14F-4D97-AF65-F5344CB8AC3E}">
@@ -5824,11 +5745,11 @@
   <p:clrMapOvr>
     <a:masterClrMapping/>
   </p:clrMapOvr>
-  <mc:AlternateContent xmlns:mc="http://schemas.openxmlformats.org/markup-compatibility/2006">
-    <mc:Choice xmlns:p14="http://schemas.microsoft.com/office/powerpoint/2010/main" Requires="p14">
+  <mc:AlternateContent xmlns:mc="http://schemas.openxmlformats.org/markup-compatibility/2006" xmlns:p14="http://schemas.microsoft.com/office/powerpoint/2010/main">
+    <mc:Choice Requires="p14">
       <p:transition spd="slow" p14:dur="2000"/>
     </mc:Choice>
-    <mc:Fallback>
+    <mc:Fallback xmlns="">
       <p:transition spd="slow"/>
     </mc:Fallback>
   </mc:AlternateContent>
@@ -6382,11 +6303,11 @@
   <p:clrMapOvr>
     <a:masterClrMapping/>
   </p:clrMapOvr>
-  <mc:AlternateContent xmlns:mc="http://schemas.openxmlformats.org/markup-compatibility/2006">
-    <mc:Choice xmlns:p14="http://schemas.microsoft.com/office/powerpoint/2010/main" Requires="p14">
+  <mc:AlternateContent xmlns:mc="http://schemas.openxmlformats.org/markup-compatibility/2006" xmlns:p14="http://schemas.microsoft.com/office/powerpoint/2010/main">
+    <mc:Choice Requires="p14">
       <p:transition spd="slow" p14:dur="2000"/>
     </mc:Choice>
-    <mc:Fallback>
+    <mc:Fallback xmlns="">
       <p:transition spd="slow"/>
     </mc:Fallback>
   </mc:AlternateContent>
@@ -7148,11 +7069,11 @@
   <p:clrMapOvr>
     <a:masterClrMapping/>
   </p:clrMapOvr>
-  <mc:AlternateContent xmlns:mc="http://schemas.openxmlformats.org/markup-compatibility/2006">
-    <mc:Choice xmlns:p14="http://schemas.microsoft.com/office/powerpoint/2010/main" Requires="p14">
+  <mc:AlternateContent xmlns:mc="http://schemas.openxmlformats.org/markup-compatibility/2006" xmlns:p14="http://schemas.microsoft.com/office/powerpoint/2010/main">
+    <mc:Choice Requires="p14">
       <p:transition spd="slow" p14:dur="2000"/>
     </mc:Choice>
-    <mc:Fallback>
+    <mc:Fallback xmlns="">
       <p:transition spd="slow"/>
     </mc:Fallback>
   </mc:AlternateContent>
@@ -7327,11 +7248,11 @@
   <p:clrMapOvr>
     <a:masterClrMapping/>
   </p:clrMapOvr>
-  <mc:AlternateContent xmlns:mc="http://schemas.openxmlformats.org/markup-compatibility/2006">
-    <mc:Choice xmlns:p14="http://schemas.microsoft.com/office/powerpoint/2010/main" Requires="p14">
+  <mc:AlternateContent xmlns:mc="http://schemas.openxmlformats.org/markup-compatibility/2006" xmlns:p14="http://schemas.microsoft.com/office/powerpoint/2010/main">
+    <mc:Choice Requires="p14">
       <p:transition spd="slow" p14:dur="2000"/>
     </mc:Choice>
-    <mc:Fallback>
+    <mc:Fallback xmlns="">
       <p:transition spd="slow"/>
     </mc:Fallback>
   </mc:AlternateContent>
@@ -7452,9 +7373,6 @@
               </a:rPr>
               <a:t>4 modes</a:t>
             </a:r>
-            <a:endParaRPr lang="en-US" dirty="0" smtClean="0">
-              <a:latin typeface="Arial"/>
-            </a:endParaRPr>
           </a:p>
           <a:p>
             <a:pPr lvl="2">
@@ -7611,11 +7529,11 @@
   <p:clrMapOvr>
     <a:masterClrMapping/>
   </p:clrMapOvr>
-  <mc:AlternateContent xmlns:mc="http://schemas.openxmlformats.org/markup-compatibility/2006">
-    <mc:Choice xmlns:p14="http://schemas.microsoft.com/office/powerpoint/2010/main" Requires="p14">
+  <mc:AlternateContent xmlns:mc="http://schemas.openxmlformats.org/markup-compatibility/2006" xmlns:p14="http://schemas.microsoft.com/office/powerpoint/2010/main">
+    <mc:Choice Requires="p14">
       <p:transition spd="slow" p14:dur="2000"/>
     </mc:Choice>
-    <mc:Fallback>
+    <mc:Fallback xmlns="">
       <p:transition spd="slow"/>
     </mc:Fallback>
   </mc:AlternateContent>
@@ -7665,10 +7583,6 @@
               <a:rPr lang="en-US" u="sng" cap="none" dirty="0" smtClean="0"/>
               <a:t>Let us start</a:t>
             </a:r>
-            <a:r>
-              <a:rPr lang="en-US" u="sng" cap="none" dirty="0" smtClean="0"/>
-              <a:t/>
-            </a:r>
             <a:br>
               <a:rPr lang="en-US" u="sng" cap="none" dirty="0" smtClean="0"/>
             </a:br>
@@ -7726,11 +7640,7 @@
             </a:r>
             <a:r>
               <a:rPr lang="en-US" dirty="0" smtClean="0"/>
-              <a:t>from inside </a:t>
-            </a:r>
-            <a:r>
-              <a:rPr lang="en-US" dirty="0" smtClean="0"/>
-              <a:t>vim </a:t>
+              <a:t>from inside vim </a:t>
             </a:r>
             <a:r>
               <a:rPr lang="en-US" dirty="0"/>
@@ -7803,11 +7713,7 @@
             </a:r>
             <a:r>
               <a:rPr lang="en-US" dirty="0" err="1" smtClean="0"/>
-              <a:t>sav</a:t>
-            </a:r>
-            <a:r>
-              <a:rPr lang="en-US" dirty="0" err="1" smtClean="0"/>
-              <a:t>eas</a:t>
+              <a:t>saveas</a:t>
             </a:r>
             <a:r>
               <a:rPr lang="en-US" dirty="0" smtClean="0"/>
@@ -7921,11 +7827,11 @@
   <p:clrMapOvr>
     <a:masterClrMapping/>
   </p:clrMapOvr>
-  <mc:AlternateContent xmlns:mc="http://schemas.openxmlformats.org/markup-compatibility/2006">
-    <mc:Choice xmlns:p14="http://schemas.microsoft.com/office/powerpoint/2010/main" Requires="p14">
+  <mc:AlternateContent xmlns:mc="http://schemas.openxmlformats.org/markup-compatibility/2006" xmlns:p14="http://schemas.microsoft.com/office/powerpoint/2010/main">
+    <mc:Choice Requires="p14">
       <p:transition spd="slow" p14:dur="2000"/>
     </mc:Choice>
-    <mc:Fallback>
+    <mc:Fallback xmlns="">
       <p:transition spd="slow"/>
     </mc:Fallback>
   </mc:AlternateContent>
@@ -8213,11 +8119,11 @@
   <p:clrMapOvr>
     <a:masterClrMapping/>
   </p:clrMapOvr>
-  <mc:AlternateContent xmlns:mc="http://schemas.openxmlformats.org/markup-compatibility/2006">
-    <mc:Choice xmlns:p14="http://schemas.microsoft.com/office/powerpoint/2010/main" Requires="p14">
+  <mc:AlternateContent xmlns:mc="http://schemas.openxmlformats.org/markup-compatibility/2006" xmlns:p14="http://schemas.microsoft.com/office/powerpoint/2010/main">
+    <mc:Choice Requires="p14">
       <p:transition spd="slow" p14:dur="2000"/>
     </mc:Choice>
-    <mc:Fallback>
+    <mc:Fallback xmlns="">
       <p:transition spd="slow"/>
     </mc:Fallback>
   </mc:AlternateContent>
@@ -8529,11 +8435,11 @@
   <p:clrMapOvr>
     <a:masterClrMapping/>
   </p:clrMapOvr>
-  <mc:AlternateContent xmlns:mc="http://schemas.openxmlformats.org/markup-compatibility/2006">
-    <mc:Choice xmlns:p14="http://schemas.microsoft.com/office/powerpoint/2010/main" Requires="p14">
+  <mc:AlternateContent xmlns:mc="http://schemas.openxmlformats.org/markup-compatibility/2006" xmlns:p14="http://schemas.microsoft.com/office/powerpoint/2010/main">
+    <mc:Choice Requires="p14">
       <p:transition spd="slow" p14:dur="2000"/>
     </mc:Choice>
-    <mc:Fallback>
+    <mc:Fallback xmlns="">
       <p:transition spd="slow"/>
     </mc:Fallback>
   </mc:AlternateContent>

</xml_diff>